<commit_message>
Capstone 1 report rev1
</commit_message>
<xml_diff>
--- a/Capstone_1/Ou_Jin_Capstone_1_Project_Report.pptx
+++ b/Capstone_1/Ou_Jin_Capstone_1_Project_Report.pptx
@@ -32,16 +32,16 @@
   <p:notesSz cx="6858000" cy="9144000"/>
   <p:embeddedFontLst>
     <p:embeddedFont>
-      <p:font typeface="Roboto" panose="020B0604020202020204" charset="0"/>
+      <p:font typeface="Roboto Slab" panose="020B0604020202020204" charset="0"/>
       <p:regular r:id="rId22"/>
       <p:bold r:id="rId23"/>
-      <p:italic r:id="rId24"/>
-      <p:boldItalic r:id="rId25"/>
     </p:embeddedFont>
     <p:embeddedFont>
-      <p:font typeface="Roboto Slab" panose="020B0604020202020204" charset="0"/>
-      <p:regular r:id="rId26"/>
-      <p:bold r:id="rId27"/>
+      <p:font typeface="Roboto" panose="020B0604020202020204" charset="0"/>
+      <p:regular r:id="rId24"/>
+      <p:bold r:id="rId25"/>
+      <p:italic r:id="rId26"/>
+      <p:boldItalic r:id="rId27"/>
     </p:embeddedFont>
   </p:embeddedFontLst>
   <p:defaultTextStyle>
@@ -501,7 +501,7 @@
     </p:spTree>
     <p:extLst>
       <p:ext uri="{BB962C8B-B14F-4D97-AF65-F5344CB8AC3E}">
-        <p14:creationId xmlns:p14="http://schemas.microsoft.com/office/powerpoint/2010/main" val="3486411255"/>
+        <p14:creationId xmlns:p14="http://schemas.microsoft.com/office/powerpoint/2010/main" val="3551566950"/>
       </p:ext>
     </p:extLst>
   </p:cSld>
@@ -837,7 +837,7 @@
     </p:spTree>
     <p:extLst>
       <p:ext uri="{BB962C8B-B14F-4D97-AF65-F5344CB8AC3E}">
-        <p14:creationId xmlns:p14="http://schemas.microsoft.com/office/powerpoint/2010/main" val="4142742184"/>
+        <p14:creationId xmlns:p14="http://schemas.microsoft.com/office/powerpoint/2010/main" val="4291143740"/>
       </p:ext>
     </p:extLst>
   </p:cSld>
@@ -946,7 +946,7 @@
     </p:spTree>
     <p:extLst>
       <p:ext uri="{BB962C8B-B14F-4D97-AF65-F5344CB8AC3E}">
-        <p14:creationId xmlns:p14="http://schemas.microsoft.com/office/powerpoint/2010/main" val="630006825"/>
+        <p14:creationId xmlns:p14="http://schemas.microsoft.com/office/powerpoint/2010/main" val="2359836676"/>
       </p:ext>
     </p:extLst>
   </p:cSld>
@@ -1055,7 +1055,7 @@
     </p:spTree>
     <p:extLst>
       <p:ext uri="{BB962C8B-B14F-4D97-AF65-F5344CB8AC3E}">
-        <p14:creationId xmlns:p14="http://schemas.microsoft.com/office/powerpoint/2010/main" val="145244051"/>
+        <p14:creationId xmlns:p14="http://schemas.microsoft.com/office/powerpoint/2010/main" val="4124597644"/>
       </p:ext>
     </p:extLst>
   </p:cSld>
@@ -1164,7 +1164,7 @@
     </p:spTree>
     <p:extLst>
       <p:ext uri="{BB962C8B-B14F-4D97-AF65-F5344CB8AC3E}">
-        <p14:creationId xmlns:p14="http://schemas.microsoft.com/office/powerpoint/2010/main" val="3644691345"/>
+        <p14:creationId xmlns:p14="http://schemas.microsoft.com/office/powerpoint/2010/main" val="1930798612"/>
       </p:ext>
     </p:extLst>
   </p:cSld>
@@ -1273,7 +1273,7 @@
     </p:spTree>
     <p:extLst>
       <p:ext uri="{BB962C8B-B14F-4D97-AF65-F5344CB8AC3E}">
-        <p14:creationId xmlns:p14="http://schemas.microsoft.com/office/powerpoint/2010/main" val="3409094567"/>
+        <p14:creationId xmlns:p14="http://schemas.microsoft.com/office/powerpoint/2010/main" val="1348152816"/>
       </p:ext>
     </p:extLst>
   </p:cSld>
@@ -1382,7 +1382,7 @@
     </p:spTree>
     <p:extLst>
       <p:ext uri="{BB962C8B-B14F-4D97-AF65-F5344CB8AC3E}">
-        <p14:creationId xmlns:p14="http://schemas.microsoft.com/office/powerpoint/2010/main" val="590280249"/>
+        <p14:creationId xmlns:p14="http://schemas.microsoft.com/office/powerpoint/2010/main" val="1135425900"/>
       </p:ext>
     </p:extLst>
   </p:cSld>
@@ -1491,7 +1491,7 @@
     </p:spTree>
     <p:extLst>
       <p:ext uri="{BB962C8B-B14F-4D97-AF65-F5344CB8AC3E}">
-        <p14:creationId xmlns:p14="http://schemas.microsoft.com/office/powerpoint/2010/main" val="1380415126"/>
+        <p14:creationId xmlns:p14="http://schemas.microsoft.com/office/powerpoint/2010/main" val="631839837"/>
       </p:ext>
     </p:extLst>
   </p:cSld>
@@ -1600,7 +1600,7 @@
     </p:spTree>
     <p:extLst>
       <p:ext uri="{BB962C8B-B14F-4D97-AF65-F5344CB8AC3E}">
-        <p14:creationId xmlns:p14="http://schemas.microsoft.com/office/powerpoint/2010/main" val="934616488"/>
+        <p14:creationId xmlns:p14="http://schemas.microsoft.com/office/powerpoint/2010/main" val="1767424191"/>
       </p:ext>
     </p:extLst>
   </p:cSld>
@@ -1709,7 +1709,7 @@
     </p:spTree>
     <p:extLst>
       <p:ext uri="{BB962C8B-B14F-4D97-AF65-F5344CB8AC3E}">
-        <p14:creationId xmlns:p14="http://schemas.microsoft.com/office/powerpoint/2010/main" val="1921883985"/>
+        <p14:creationId xmlns:p14="http://schemas.microsoft.com/office/powerpoint/2010/main" val="4270709001"/>
       </p:ext>
     </p:extLst>
   </p:cSld>
@@ -1818,7 +1818,7 @@
     </p:spTree>
     <p:extLst>
       <p:ext uri="{BB962C8B-B14F-4D97-AF65-F5344CB8AC3E}">
-        <p14:creationId xmlns:p14="http://schemas.microsoft.com/office/powerpoint/2010/main" val="1971222649"/>
+        <p14:creationId xmlns:p14="http://schemas.microsoft.com/office/powerpoint/2010/main" val="2687583175"/>
       </p:ext>
     </p:extLst>
   </p:cSld>
@@ -1927,7 +1927,7 @@
     </p:spTree>
     <p:extLst>
       <p:ext uri="{BB962C8B-B14F-4D97-AF65-F5344CB8AC3E}">
-        <p14:creationId xmlns:p14="http://schemas.microsoft.com/office/powerpoint/2010/main" val="3281788944"/>
+        <p14:creationId xmlns:p14="http://schemas.microsoft.com/office/powerpoint/2010/main" val="3464585877"/>
       </p:ext>
     </p:extLst>
   </p:cSld>
@@ -2036,7 +2036,7 @@
     </p:spTree>
     <p:extLst>
       <p:ext uri="{BB962C8B-B14F-4D97-AF65-F5344CB8AC3E}">
-        <p14:creationId xmlns:p14="http://schemas.microsoft.com/office/powerpoint/2010/main" val="364033523"/>
+        <p14:creationId xmlns:p14="http://schemas.microsoft.com/office/powerpoint/2010/main" val="2027177383"/>
       </p:ext>
     </p:extLst>
   </p:cSld>
@@ -2145,7 +2145,7 @@
     </p:spTree>
     <p:extLst>
       <p:ext uri="{BB962C8B-B14F-4D97-AF65-F5344CB8AC3E}">
-        <p14:creationId xmlns:p14="http://schemas.microsoft.com/office/powerpoint/2010/main" val="3136080869"/>
+        <p14:creationId xmlns:p14="http://schemas.microsoft.com/office/powerpoint/2010/main" val="2571652719"/>
       </p:ext>
     </p:extLst>
   </p:cSld>
@@ -2254,7 +2254,7 @@
     </p:spTree>
     <p:extLst>
       <p:ext uri="{BB962C8B-B14F-4D97-AF65-F5344CB8AC3E}">
-        <p14:creationId xmlns:p14="http://schemas.microsoft.com/office/powerpoint/2010/main" val="1671739478"/>
+        <p14:creationId xmlns:p14="http://schemas.microsoft.com/office/powerpoint/2010/main" val="2304508238"/>
       </p:ext>
     </p:extLst>
   </p:cSld>
@@ -2363,7 +2363,7 @@
     </p:spTree>
     <p:extLst>
       <p:ext uri="{BB962C8B-B14F-4D97-AF65-F5344CB8AC3E}">
-        <p14:creationId xmlns:p14="http://schemas.microsoft.com/office/powerpoint/2010/main" val="2758139699"/>
+        <p14:creationId xmlns:p14="http://schemas.microsoft.com/office/powerpoint/2010/main" val="4131555010"/>
       </p:ext>
     </p:extLst>
   </p:cSld>
@@ -2472,7 +2472,7 @@
     </p:spTree>
     <p:extLst>
       <p:ext uri="{BB962C8B-B14F-4D97-AF65-F5344CB8AC3E}">
-        <p14:creationId xmlns:p14="http://schemas.microsoft.com/office/powerpoint/2010/main" val="3479212027"/>
+        <p14:creationId xmlns:p14="http://schemas.microsoft.com/office/powerpoint/2010/main" val="2919784106"/>
       </p:ext>
     </p:extLst>
   </p:cSld>
@@ -2581,7 +2581,7 @@
     </p:spTree>
     <p:extLst>
       <p:ext uri="{BB962C8B-B14F-4D97-AF65-F5344CB8AC3E}">
-        <p14:creationId xmlns:p14="http://schemas.microsoft.com/office/powerpoint/2010/main" val="1478978338"/>
+        <p14:creationId xmlns:p14="http://schemas.microsoft.com/office/powerpoint/2010/main" val="1996981984"/>
       </p:ext>
     </p:extLst>
   </p:cSld>
@@ -2690,7 +2690,7 @@
     </p:spTree>
     <p:extLst>
       <p:ext uri="{BB962C8B-B14F-4D97-AF65-F5344CB8AC3E}">
-        <p14:creationId xmlns:p14="http://schemas.microsoft.com/office/powerpoint/2010/main" val="1414878012"/>
+        <p14:creationId xmlns:p14="http://schemas.microsoft.com/office/powerpoint/2010/main" val="1388537485"/>
       </p:ext>
     </p:extLst>
   </p:cSld>
@@ -2799,7 +2799,7 @@
     </p:spTree>
     <p:extLst>
       <p:ext uri="{BB962C8B-B14F-4D97-AF65-F5344CB8AC3E}">
-        <p14:creationId xmlns:p14="http://schemas.microsoft.com/office/powerpoint/2010/main" val="2729255102"/>
+        <p14:creationId xmlns:p14="http://schemas.microsoft.com/office/powerpoint/2010/main" val="1343889875"/>
       </p:ext>
     </p:extLst>
   </p:cSld>
@@ -9918,7 +9918,7 @@
                 <a:cs typeface="Arial"/>
                 <a:sym typeface="Arial"/>
               </a:rPr>
-              <a:t>Decision Tree generated mse of 4.24 on held-out test data (make sure it is root mean squared error)</a:t>
+              <a:t>Decision Tree generated mse of 4.24 on held-out test data</a:t>
             </a:r>
             <a:endParaRPr>
               <a:latin typeface="Arial"/>
@@ -11124,7 +11124,7 @@
                 <a:cs typeface="Arial"/>
                 <a:sym typeface="Arial"/>
               </a:rPr>
-              <a:t>Drop 60 lines that have missing values.</a:t>
+              <a:t>Drop 60 lines that have missing values across most of the skillset columns.</a:t>
             </a:r>
             <a:endParaRPr sz="1200">
               <a:latin typeface="Arial"/>

</xml_diff>